<commit_message>
Cleaned up demos and added beginning of todo sample
</commit_message>
<xml_diff>
--- a/SignalR.pptx
+++ b/SignalR.pptx
@@ -5,7 +5,7 @@
     <p:sldMasterId id="2147483660" r:id="rId2"/>
   </p:sldMasterIdLst>
   <p:notesMasterIdLst>
-    <p:notesMasterId r:id="rId24"/>
+    <p:notesMasterId r:id="rId25"/>
   </p:notesMasterIdLst>
   <p:sldIdLst>
     <p:sldId id="256" r:id="rId3"/>
@@ -22,13 +22,14 @@
     <p:sldId id="272" r:id="rId14"/>
     <p:sldId id="285" r:id="rId15"/>
     <p:sldId id="273" r:id="rId16"/>
-    <p:sldId id="275" r:id="rId17"/>
-    <p:sldId id="286" r:id="rId18"/>
-    <p:sldId id="277" r:id="rId19"/>
+    <p:sldId id="277" r:id="rId17"/>
+    <p:sldId id="275" r:id="rId18"/>
+    <p:sldId id="286" r:id="rId19"/>
     <p:sldId id="274" r:id="rId20"/>
     <p:sldId id="281" r:id="rId21"/>
     <p:sldId id="279" r:id="rId22"/>
     <p:sldId id="278" r:id="rId23"/>
+    <p:sldId id="287" r:id="rId24"/>
   </p:sldIdLst>
   <p:sldSz cx="12192000" cy="6858000"/>
   <p:notesSz cx="6858000" cy="9144000"/>
@@ -146,13 +147,14 @@
             <p14:sldId id="272"/>
             <p14:sldId id="285"/>
             <p14:sldId id="273"/>
+            <p14:sldId id="277"/>
             <p14:sldId id="275"/>
             <p14:sldId id="286"/>
-            <p14:sldId id="277"/>
             <p14:sldId id="274"/>
             <p14:sldId id="281"/>
             <p14:sldId id="279"/>
             <p14:sldId id="278"/>
+            <p14:sldId id="287"/>
           </p14:sldIdLst>
         </p14:section>
       </p14:sectionLst>
@@ -263,7 +265,7 @@
           <a:p>
             <a:fld id="{EC13577B-6902-467D-A26C-08A0DD5E4E03}" type="datetimeFigureOut">
               <a:rPr lang="en-US" smtClean="0"/>
-              <a:t>24/2/2013</a:t>
+              <a:t>2/26/2013</a:t>
             </a:fld>
             <a:endParaRPr lang="en-US"/>
           </a:p>
@@ -816,7 +818,7 @@
           <a:p>
             <a:fld id="{8BEEBAAA-29B5-4AF5-BC5F-7E580C29002D}" type="datetimeFigureOut">
               <a:rPr lang="en-US" smtClean="0"/>
-              <a:t>24/2/2013</a:t>
+              <a:t>2/26/2013</a:t>
             </a:fld>
             <a:endParaRPr lang="en-US"/>
           </a:p>
@@ -1093,7 +1095,7 @@
           <a:p>
             <a:fld id="{8BEEBAAA-29B5-4AF5-BC5F-7E580C29002D}" type="datetimeFigureOut">
               <a:rPr lang="en-US" smtClean="0"/>
-              <a:t>24/2/2013</a:t>
+              <a:t>2/26/2013</a:t>
             </a:fld>
             <a:endParaRPr lang="en-US"/>
           </a:p>
@@ -1375,7 +1377,7 @@
           <a:p>
             <a:fld id="{8BEEBAAA-29B5-4AF5-BC5F-7E580C29002D}" type="datetimeFigureOut">
               <a:rPr lang="en-US" smtClean="0"/>
-              <a:t>24/2/2013</a:t>
+              <a:t>2/26/2013</a:t>
             </a:fld>
             <a:endParaRPr lang="en-US"/>
           </a:p>
@@ -1736,7 +1738,7 @@
           <a:p>
             <a:fld id="{8BEEBAAA-29B5-4AF5-BC5F-7E580C29002D}" type="datetimeFigureOut">
               <a:rPr lang="en-US" smtClean="0"/>
-              <a:t>24/2/2013</a:t>
+              <a:t>2/26/2013</a:t>
             </a:fld>
             <a:endParaRPr lang="en-US"/>
           </a:p>
@@ -2036,7 +2038,7 @@
           <a:p>
             <a:fld id="{8BEEBAAA-29B5-4AF5-BC5F-7E580C29002D}" type="datetimeFigureOut">
               <a:rPr lang="en-US" smtClean="0"/>
-              <a:t>24/2/2013</a:t>
+              <a:t>2/26/2013</a:t>
             </a:fld>
             <a:endParaRPr lang="en-US"/>
           </a:p>
@@ -2551,7 +2553,7 @@
           <a:p>
             <a:fld id="{8BEEBAAA-29B5-4AF5-BC5F-7E580C29002D}" type="datetimeFigureOut">
               <a:rPr lang="en-US" smtClean="0"/>
-              <a:t>24/2/2013</a:t>
+              <a:t>2/26/2013</a:t>
             </a:fld>
             <a:endParaRPr lang="en-US"/>
           </a:p>
@@ -3196,7 +3198,7 @@
           <a:p>
             <a:fld id="{8BEEBAAA-29B5-4AF5-BC5F-7E580C29002D}" type="datetimeFigureOut">
               <a:rPr lang="en-US" smtClean="0"/>
-              <a:t>24/2/2013</a:t>
+              <a:t>2/26/2013</a:t>
             </a:fld>
             <a:endParaRPr lang="en-US"/>
           </a:p>
@@ -3421,7 +3423,7 @@
           <a:p>
             <a:fld id="{8BEEBAAA-29B5-4AF5-BC5F-7E580C29002D}" type="datetimeFigureOut">
               <a:rPr lang="en-US" smtClean="0"/>
-              <a:t>24/2/2013</a:t>
+              <a:t>2/26/2013</a:t>
             </a:fld>
             <a:endParaRPr lang="en-US"/>
           </a:p>
@@ -3562,7 +3564,7 @@
           <a:p>
             <a:fld id="{8BEEBAAA-29B5-4AF5-BC5F-7E580C29002D}" type="datetimeFigureOut">
               <a:rPr lang="en-US" smtClean="0"/>
-              <a:t>24/2/2013</a:t>
+              <a:t>2/26/2013</a:t>
             </a:fld>
             <a:endParaRPr lang="en-US"/>
           </a:p>
@@ -3899,7 +3901,7 @@
           <a:p>
             <a:fld id="{8BEEBAAA-29B5-4AF5-BC5F-7E580C29002D}" type="datetimeFigureOut">
               <a:rPr lang="en-US" smtClean="0"/>
-              <a:t>24/2/2013</a:t>
+              <a:t>2/26/2013</a:t>
             </a:fld>
             <a:endParaRPr lang="en-US"/>
           </a:p>
@@ -4156,7 +4158,7 @@
           <a:p>
             <a:fld id="{8BEEBAAA-29B5-4AF5-BC5F-7E580C29002D}" type="datetimeFigureOut">
               <a:rPr lang="en-US" smtClean="0"/>
-              <a:t>24/2/2013</a:t>
+              <a:t>2/26/2013</a:t>
             </a:fld>
             <a:endParaRPr lang="en-US"/>
           </a:p>
@@ -4369,7 +4371,7 @@
           <a:p>
             <a:fld id="{8BEEBAAA-29B5-4AF5-BC5F-7E580C29002D}" type="datetimeFigureOut">
               <a:rPr lang="en-US" smtClean="0"/>
-              <a:t>24/2/2013</a:t>
+              <a:t>2/26/2013</a:t>
             </a:fld>
             <a:endParaRPr lang="en-US"/>
           </a:p>
@@ -4909,7 +4911,15 @@
             </a:r>
             <a:r>
               <a:rPr lang="en-US" dirty="0" smtClean="0"/>
-              <a:t> will perform content negotiation when opening a connection</a:t>
+              <a:t> will perform </a:t>
+            </a:r>
+            <a:r>
+              <a:rPr lang="en-US" dirty="0" smtClean="0"/>
+              <a:t>connection negotiation </a:t>
+            </a:r>
+            <a:r>
+              <a:rPr lang="en-US" dirty="0" smtClean="0"/>
+              <a:t>when opening a connection</a:t>
             </a:r>
           </a:p>
           <a:p>
@@ -5141,7 +5151,6 @@
               <a:rPr lang="en-US" dirty="0" smtClean="0"/>
               <a:t>You must specify the route</a:t>
             </a:r>
-            <a:endParaRPr lang="en-US" dirty="0" smtClean="0"/>
           </a:p>
           <a:p>
             <a:pPr marL="285750" indent="-285750">
@@ -5449,6 +5458,97 @@
           <a:p>
             <a:r>
               <a:rPr lang="en-US" dirty="0" smtClean="0"/>
+              <a:t>Demo</a:t>
+            </a:r>
+            <a:endParaRPr lang="en-NZ" dirty="0"/>
+          </a:p>
+        </p:txBody>
+      </p:sp>
+      <p:sp>
+        <p:nvSpPr>
+          <p:cNvPr id="3" name="Text Placeholder 2"/>
+          <p:cNvSpPr>
+            <a:spLocks noGrp="1"/>
+          </p:cNvSpPr>
+          <p:nvPr>
+            <p:ph type="body" idx="1"/>
+          </p:nvPr>
+        </p:nvSpPr>
+        <p:spPr/>
+        <p:txBody>
+          <a:bodyPr/>
+          <a:lstStyle/>
+          <a:p>
+            <a:r>
+              <a:rPr lang="en-US" dirty="0" smtClean="0"/>
+              <a:t>A </a:t>
+            </a:r>
+            <a:r>
+              <a:rPr lang="en-US" dirty="0" err="1" smtClean="0"/>
+              <a:t>SignalR</a:t>
+            </a:r>
+            <a:r>
+              <a:rPr lang="en-US" dirty="0" smtClean="0"/>
+              <a:t> Client App</a:t>
+            </a:r>
+            <a:endParaRPr lang="en-NZ" dirty="0"/>
+          </a:p>
+        </p:txBody>
+      </p:sp>
+    </p:spTree>
+    <p:extLst>
+      <p:ext uri="{BB962C8B-B14F-4D97-AF65-F5344CB8AC3E}">
+        <p14:creationId xmlns:p14="http://schemas.microsoft.com/office/powerpoint/2010/main" val="1778800575"/>
+      </p:ext>
+    </p:extLst>
+  </p:cSld>
+  <p:clrMapOvr>
+    <a:masterClrMapping/>
+  </p:clrMapOvr>
+  <p:timing>
+    <p:tnLst>
+      <p:par>
+        <p:cTn id="1" dur="indefinite" restart="never" nodeType="tmRoot"/>
+      </p:par>
+    </p:tnLst>
+  </p:timing>
+</p:sld>
+</file>
+
+<file path=ppt/slides/slide16.xml><?xml version="1.0" encoding="utf-8"?>
+<p:sld xmlns:a="http://schemas.openxmlformats.org/drawingml/2006/main" xmlns:r="http://schemas.openxmlformats.org/officeDocument/2006/relationships" xmlns:p="http://schemas.openxmlformats.org/presentationml/2006/main">
+  <p:cSld>
+    <p:spTree>
+      <p:nvGrpSpPr>
+        <p:cNvPr id="1" name=""/>
+        <p:cNvGrpSpPr/>
+        <p:nvPr/>
+      </p:nvGrpSpPr>
+      <p:grpSpPr>
+        <a:xfrm>
+          <a:off x="0" y="0"/>
+          <a:ext cx="0" cy="0"/>
+          <a:chOff x="0" y="0"/>
+          <a:chExt cx="0" cy="0"/>
+        </a:xfrm>
+      </p:grpSpPr>
+      <p:sp>
+        <p:nvSpPr>
+          <p:cNvPr id="2" name="Title 1"/>
+          <p:cNvSpPr>
+            <a:spLocks noGrp="1"/>
+          </p:cNvSpPr>
+          <p:nvPr>
+            <p:ph type="title"/>
+          </p:nvPr>
+        </p:nvSpPr>
+        <p:spPr/>
+        <p:txBody>
+          <a:bodyPr/>
+          <a:lstStyle/>
+          <a:p>
+            <a:r>
+              <a:rPr lang="en-US" dirty="0" smtClean="0"/>
               <a:t>Clients</a:t>
             </a:r>
             <a:endParaRPr lang="en-NZ" dirty="0"/>
@@ -5483,8 +5583,65 @@
             </a:r>
             <a:r>
               <a:rPr lang="en-US" dirty="0" smtClean="0"/>
-              <a:t> 4.0+</a:t>
+              <a:t> 4.0</a:t>
             </a:r>
+            <a:r>
+              <a:rPr lang="en-US" dirty="0" smtClean="0"/>
+              <a:t>+</a:t>
+            </a:r>
+          </a:p>
+          <a:p>
+            <a:r>
+              <a:rPr lang="en-US" dirty="0" err="1" smtClean="0"/>
+              <a:t>WinRT</a:t>
+            </a:r>
+            <a:endParaRPr lang="en-US" dirty="0" smtClean="0"/>
+          </a:p>
+          <a:p>
+            <a:r>
+              <a:rPr lang="en-US" dirty="0" smtClean="0"/>
+              <a:t>Windows Phone 8</a:t>
+            </a:r>
+          </a:p>
+          <a:p>
+            <a:r>
+              <a:rPr lang="en-US" dirty="0" smtClean="0">
+                <a:solidFill>
+                  <a:schemeClr val="accent5"/>
+                </a:solidFill>
+              </a:rPr>
+              <a:t>Node</a:t>
+            </a:r>
+          </a:p>
+          <a:p>
+            <a:r>
+              <a:rPr lang="en-US" dirty="0" err="1" smtClean="0">
+                <a:solidFill>
+                  <a:schemeClr val="accent5"/>
+                </a:solidFill>
+              </a:rPr>
+              <a:t>iOS</a:t>
+            </a:r>
+            <a:endParaRPr lang="en-US" dirty="0" smtClean="0">
+              <a:solidFill>
+                <a:schemeClr val="accent5"/>
+              </a:solidFill>
+            </a:endParaRPr>
+          </a:p>
+          <a:p>
+            <a:r>
+              <a:rPr lang="en-US" dirty="0" smtClean="0">
+                <a:solidFill>
+                  <a:schemeClr val="accent5"/>
+                </a:solidFill>
+              </a:rPr>
+              <a:t>Android</a:t>
+            </a:r>
+            <a:endParaRPr lang="en-US" dirty="0" smtClean="0">
+              <a:solidFill>
+                <a:schemeClr val="accent5"/>
+              </a:solidFill>
+            </a:endParaRPr>
           </a:p>
           <a:p>
             <a:endParaRPr lang="en-NZ" dirty="0"/>
@@ -5511,7 +5668,7 @@
 </p:sld>
 </file>
 
-<file path=ppt/slides/slide16.xml><?xml version="1.0" encoding="utf-8"?>
+<file path=ppt/slides/slide17.xml><?xml version="1.0" encoding="utf-8"?>
 <p:sld xmlns:a="http://schemas.openxmlformats.org/drawingml/2006/main" xmlns:r="http://schemas.openxmlformats.org/officeDocument/2006/relationships" xmlns:p="http://schemas.openxmlformats.org/presentationml/2006/main">
   <p:cSld>
     <p:spTree>
@@ -5585,11 +5742,7 @@
             </a:r>
             <a:r>
               <a:rPr lang="en-US" dirty="0" err="1" smtClean="0"/>
-              <a:t>GlobalHost.Connection</a:t>
-            </a:r>
-            <a:r>
-              <a:rPr lang="en-US" dirty="0" err="1" smtClean="0"/>
-              <a:t>Manager</a:t>
+              <a:t>GlobalHost.ConnectionManager</a:t>
             </a:r>
             <a:endParaRPr lang="en-US" dirty="0" smtClean="0"/>
           </a:p>
@@ -5633,7 +5786,6 @@
               <a:rPr lang="en-US" dirty="0" smtClean="0"/>
               <a:t>Send (including to groups)</a:t>
             </a:r>
-            <a:endParaRPr lang="en-US" dirty="0" smtClean="0"/>
           </a:p>
           <a:p>
             <a:endParaRPr lang="en-NZ" dirty="0"/>
@@ -5644,97 +5796,6 @@
     <p:extLst>
       <p:ext uri="{BB962C8B-B14F-4D97-AF65-F5344CB8AC3E}">
         <p14:creationId xmlns:p14="http://schemas.microsoft.com/office/powerpoint/2010/main" val="3211559953"/>
-      </p:ext>
-    </p:extLst>
-  </p:cSld>
-  <p:clrMapOvr>
-    <a:masterClrMapping/>
-  </p:clrMapOvr>
-  <p:timing>
-    <p:tnLst>
-      <p:par>
-        <p:cTn id="1" dur="indefinite" restart="never" nodeType="tmRoot"/>
-      </p:par>
-    </p:tnLst>
-  </p:timing>
-</p:sld>
-</file>
-
-<file path=ppt/slides/slide17.xml><?xml version="1.0" encoding="utf-8"?>
-<p:sld xmlns:a="http://schemas.openxmlformats.org/drawingml/2006/main" xmlns:r="http://schemas.openxmlformats.org/officeDocument/2006/relationships" xmlns:p="http://schemas.openxmlformats.org/presentationml/2006/main">
-  <p:cSld>
-    <p:spTree>
-      <p:nvGrpSpPr>
-        <p:cNvPr id="1" name=""/>
-        <p:cNvGrpSpPr/>
-        <p:nvPr/>
-      </p:nvGrpSpPr>
-      <p:grpSpPr>
-        <a:xfrm>
-          <a:off x="0" y="0"/>
-          <a:ext cx="0" cy="0"/>
-          <a:chOff x="0" y="0"/>
-          <a:chExt cx="0" cy="0"/>
-        </a:xfrm>
-      </p:grpSpPr>
-      <p:sp>
-        <p:nvSpPr>
-          <p:cNvPr id="2" name="Title 1"/>
-          <p:cNvSpPr>
-            <a:spLocks noGrp="1"/>
-          </p:cNvSpPr>
-          <p:nvPr>
-            <p:ph type="title"/>
-          </p:nvPr>
-        </p:nvSpPr>
-        <p:spPr/>
-        <p:txBody>
-          <a:bodyPr/>
-          <a:lstStyle/>
-          <a:p>
-            <a:r>
-              <a:rPr lang="en-US" dirty="0" smtClean="0"/>
-              <a:t>Demo</a:t>
-            </a:r>
-            <a:endParaRPr lang="en-NZ" dirty="0"/>
-          </a:p>
-        </p:txBody>
-      </p:sp>
-      <p:sp>
-        <p:nvSpPr>
-          <p:cNvPr id="3" name="Text Placeholder 2"/>
-          <p:cNvSpPr>
-            <a:spLocks noGrp="1"/>
-          </p:cNvSpPr>
-          <p:nvPr>
-            <p:ph type="body" idx="1"/>
-          </p:nvPr>
-        </p:nvSpPr>
-        <p:spPr/>
-        <p:txBody>
-          <a:bodyPr/>
-          <a:lstStyle/>
-          <a:p>
-            <a:r>
-              <a:rPr lang="en-US" dirty="0" smtClean="0"/>
-              <a:t>A </a:t>
-            </a:r>
-            <a:r>
-              <a:rPr lang="en-US" dirty="0" err="1" smtClean="0"/>
-              <a:t>SignalR</a:t>
-            </a:r>
-            <a:r>
-              <a:rPr lang="en-US" dirty="0" smtClean="0"/>
-              <a:t> Client App</a:t>
-            </a:r>
-            <a:endParaRPr lang="en-NZ" dirty="0"/>
-          </a:p>
-        </p:txBody>
-      </p:sp>
-    </p:spTree>
-    <p:extLst>
-      <p:ext uri="{BB962C8B-B14F-4D97-AF65-F5344CB8AC3E}">
-        <p14:creationId xmlns:p14="http://schemas.microsoft.com/office/powerpoint/2010/main" val="1778800575"/>
       </p:ext>
     </p:extLst>
   </p:cSld>
@@ -5803,8 +5864,8 @@
         </p:nvSpPr>
         <p:spPr>
           <a:xfrm>
-            <a:off x="838201" y="1825625"/>
-            <a:ext cx="5010664" cy="4351338"/>
+            <a:off x="838200" y="1825625"/>
+            <a:ext cx="8404653" cy="4351338"/>
           </a:xfrm>
         </p:spPr>
         <p:txBody>
@@ -5835,11 +5896,7 @@
             </a:pPr>
             <a:r>
               <a:rPr lang="en-US" dirty="0" smtClean="0"/>
-              <a:t>Tested to </a:t>
-            </a:r>
-            <a:r>
-              <a:rPr lang="en-US" dirty="0" smtClean="0"/>
-              <a:t>hundreds of thousands of idle connections per node (IIS tweaks)</a:t>
+              <a:t>Tested to hundreds of thousands of idle connections per node (IIS tweaks)</a:t>
             </a:r>
             <a:endParaRPr lang="en-US" dirty="0"/>
           </a:p>
@@ -5850,11 +5907,7 @@
             </a:pPr>
             <a:r>
               <a:rPr lang="en-US" dirty="0" smtClean="0"/>
-              <a:t>Combined with a backplane or persistent message store can scale horizontally</a:t>
-            </a:r>
-            <a:r>
-              <a:rPr lang="en-US" dirty="0" smtClean="0"/>
-              <a:t>.</a:t>
+              <a:t>Combined with a backplane or persistent message store can scale horizontally.</a:t>
             </a:r>
           </a:p>
           <a:p>
@@ -5932,7 +5985,15 @@
           <a:p>
             <a:r>
               <a:rPr lang="en-US" dirty="0" smtClean="0"/>
-              <a:t>What would I use it for</a:t>
+              <a:t>W</a:t>
+            </a:r>
+            <a:r>
+              <a:rPr lang="en-US" dirty="0" smtClean="0"/>
+              <a:t>hat </a:t>
+            </a:r>
+            <a:r>
+              <a:rPr lang="en-US" dirty="0" smtClean="0"/>
+              <a:t>would I use it for</a:t>
             </a:r>
             <a:endParaRPr lang="en-NZ" dirty="0"/>
           </a:p>
@@ -6615,6 +6676,155 @@
     <p:extLst>
       <p:ext uri="{BB962C8B-B14F-4D97-AF65-F5344CB8AC3E}">
         <p14:creationId xmlns:p14="http://schemas.microsoft.com/office/powerpoint/2010/main" val="2947265590"/>
+      </p:ext>
+    </p:extLst>
+  </p:cSld>
+  <p:clrMapOvr>
+    <a:masterClrMapping/>
+  </p:clrMapOvr>
+  <p:timing>
+    <p:tnLst>
+      <p:par>
+        <p:cTn id="1" dur="indefinite" restart="never" nodeType="tmRoot"/>
+      </p:par>
+    </p:tnLst>
+  </p:timing>
+</p:sld>
+</file>
+
+<file path=ppt/slides/slide22.xml><?xml version="1.0" encoding="utf-8"?>
+<p:sld xmlns:a="http://schemas.openxmlformats.org/drawingml/2006/main" xmlns:r="http://schemas.openxmlformats.org/officeDocument/2006/relationships" xmlns:p="http://schemas.openxmlformats.org/presentationml/2006/main">
+  <p:cSld>
+    <p:spTree>
+      <p:nvGrpSpPr>
+        <p:cNvPr id="1" name=""/>
+        <p:cNvGrpSpPr/>
+        <p:nvPr/>
+      </p:nvGrpSpPr>
+      <p:grpSpPr>
+        <a:xfrm>
+          <a:off x="0" y="0"/>
+          <a:ext cx="0" cy="0"/>
+          <a:chOff x="0" y="0"/>
+          <a:chExt cx="0" cy="0"/>
+        </a:xfrm>
+      </p:grpSpPr>
+      <p:sp>
+        <p:nvSpPr>
+          <p:cNvPr id="2" name="Title 1"/>
+          <p:cNvSpPr>
+            <a:spLocks noGrp="1"/>
+          </p:cNvSpPr>
+          <p:nvPr>
+            <p:ph type="title"/>
+          </p:nvPr>
+        </p:nvSpPr>
+        <p:spPr/>
+        <p:txBody>
+          <a:bodyPr/>
+          <a:lstStyle/>
+          <a:p>
+            <a:r>
+              <a:rPr lang="en-US" dirty="0" smtClean="0"/>
+              <a:t>Where next</a:t>
+            </a:r>
+            <a:endParaRPr lang="en-NZ" dirty="0"/>
+          </a:p>
+        </p:txBody>
+      </p:sp>
+      <p:sp>
+        <p:nvSpPr>
+          <p:cNvPr id="3" name="Content Placeholder 2"/>
+          <p:cNvSpPr>
+            <a:spLocks noGrp="1"/>
+          </p:cNvSpPr>
+          <p:nvPr>
+            <p:ph idx="1"/>
+          </p:nvPr>
+        </p:nvSpPr>
+        <p:spPr>
+          <a:xfrm>
+            <a:off x="838201" y="1825625"/>
+            <a:ext cx="5010664" cy="4351338"/>
+          </a:xfrm>
+        </p:spPr>
+        <p:txBody>
+          <a:bodyPr/>
+          <a:lstStyle/>
+          <a:p>
+            <a:r>
+              <a:rPr lang="en-US" dirty="0" smtClean="0"/>
+              <a:t>Signalr.net</a:t>
+            </a:r>
+            <a:endParaRPr lang="en-US" dirty="0" smtClean="0"/>
+          </a:p>
+          <a:p>
+            <a:pPr marL="285750" indent="-285750">
+              <a:buFont typeface="Arial" panose="020B0604020202020204" pitchFamily="34" charset="0"/>
+              <a:buChar char="•"/>
+            </a:pPr>
+            <a:r>
+              <a:rPr lang="en-US" dirty="0" smtClean="0"/>
+              <a:t>Long running </a:t>
+            </a:r>
+            <a:r>
+              <a:rPr lang="en-US" dirty="0" err="1" smtClean="0"/>
+              <a:t>async</a:t>
+            </a:r>
+            <a:r>
+              <a:rPr lang="en-US" dirty="0" smtClean="0"/>
+              <a:t> requests</a:t>
+            </a:r>
+          </a:p>
+          <a:p>
+            <a:pPr marL="285750" indent="-285750">
+              <a:buFont typeface="Arial" panose="020B0604020202020204" pitchFamily="34" charset="0"/>
+              <a:buChar char="•"/>
+            </a:pPr>
+            <a:r>
+              <a:rPr lang="en-US" dirty="0" smtClean="0"/>
+              <a:t>Thick client toast notifications (Pre-Win8)</a:t>
+            </a:r>
+          </a:p>
+          <a:p>
+            <a:pPr marL="285750" indent="-285750">
+              <a:buFont typeface="Arial" panose="020B0604020202020204" pitchFamily="34" charset="0"/>
+              <a:buChar char="•"/>
+            </a:pPr>
+            <a:r>
+              <a:rPr lang="en-US" dirty="0" smtClean="0"/>
+              <a:t>Chat</a:t>
+            </a:r>
+          </a:p>
+          <a:p>
+            <a:pPr marL="285750" indent="-285750">
+              <a:buFont typeface="Arial" panose="020B0604020202020204" pitchFamily="34" charset="0"/>
+              <a:buChar char="•"/>
+            </a:pPr>
+            <a:r>
+              <a:rPr lang="en-US" dirty="0" smtClean="0"/>
+              <a:t>Telemetry</a:t>
+            </a:r>
+          </a:p>
+          <a:p>
+            <a:pPr marL="285750" indent="-285750">
+              <a:buFont typeface="Arial" panose="020B0604020202020204" pitchFamily="34" charset="0"/>
+              <a:buChar char="•"/>
+            </a:pPr>
+            <a:r>
+              <a:rPr lang="en-US" dirty="0" smtClean="0"/>
+              <a:t>Change Notification / Cache Eviction</a:t>
+            </a:r>
+          </a:p>
+          <a:p>
+            <a:endParaRPr lang="en-NZ" dirty="0" smtClean="0"/>
+          </a:p>
+        </p:txBody>
+      </p:sp>
+    </p:spTree>
+    <p:extLst>
+      <p:ext uri="{BB962C8B-B14F-4D97-AF65-F5344CB8AC3E}">
+        <p14:creationId xmlns:p14="http://schemas.microsoft.com/office/powerpoint/2010/main" val="3164031812"/>
       </p:ext>
     </p:extLst>
   </p:cSld>
@@ -18773,7 +18983,6 @@
               <a:rPr lang="en-US" dirty="0" smtClean="0"/>
               <a:t>Client re-opens connection immediately to receive next batch of messages</a:t>
             </a:r>
-            <a:endParaRPr lang="en-US" dirty="0" smtClean="0"/>
           </a:p>
         </p:txBody>
       </p:sp>
@@ -27879,7 +28088,6 @@
               <a:rPr lang="en-US" dirty="0" smtClean="0"/>
               <a:t>Uses forever frame in IE</a:t>
             </a:r>
-            <a:endParaRPr lang="en-US" dirty="0" smtClean="0"/>
           </a:p>
         </p:txBody>
       </p:sp>

</xml_diff>